<commit_message>
graphs and charts in xlsx files
</commit_message>
<xml_diff>
--- a/Missed_Trash_Pickups_Presentation_16x9_Formatted.pptx
+++ b/Missed_Trash_Pickups_Presentation_16x9_Formatted.pptx
@@ -6,18 +6,19 @@
   </p:sldMasterIdLst>
   <p:sldIdLst>
     <p:sldId id="256" r:id="rId2"/>
-    <p:sldId id="257" r:id="rId3"/>
-    <p:sldId id="258" r:id="rId4"/>
-    <p:sldId id="259" r:id="rId5"/>
-    <p:sldId id="260" r:id="rId6"/>
+    <p:sldId id="271" r:id="rId3"/>
+    <p:sldId id="257" r:id="rId4"/>
+    <p:sldId id="258" r:id="rId5"/>
+    <p:sldId id="259" r:id="rId6"/>
     <p:sldId id="261" r:id="rId7"/>
-    <p:sldId id="262" r:id="rId8"/>
-    <p:sldId id="263" r:id="rId9"/>
-    <p:sldId id="264" r:id="rId10"/>
-    <p:sldId id="265" r:id="rId11"/>
-    <p:sldId id="266" r:id="rId12"/>
-    <p:sldId id="267" r:id="rId13"/>
-    <p:sldId id="268" r:id="rId14"/>
+    <p:sldId id="260" r:id="rId8"/>
+    <p:sldId id="272" r:id="rId9"/>
+    <p:sldId id="262" r:id="rId10"/>
+    <p:sldId id="263" r:id="rId11"/>
+    <p:sldId id="264" r:id="rId12"/>
+    <p:sldId id="265" r:id="rId13"/>
+    <p:sldId id="266" r:id="rId14"/>
+    <p:sldId id="268" r:id="rId15"/>
   </p:sldIdLst>
   <p:sldSz cx="12188825" cy="6858000"/>
   <p:notesSz cx="6858000" cy="9144000"/>
@@ -135,12 +136,20 @@
 </p:presentation>
 </file>
 
+<file path=ppt/revisionInfo.xml><?xml version="1.0" encoding="utf-8"?>
+<p1510:revInfo xmlns:a="http://schemas.openxmlformats.org/drawingml/2006/main" xmlns:r="http://schemas.openxmlformats.org/officeDocument/2006/relationships" xmlns:p1510="http://schemas.microsoft.com/office/powerpoint/2015/10/main">
+  <p1510:revLst>
+    <p1510:client id="{EB2374DA-CEBC-4DD2-9AAA-532ACA94E2AA}" v="17" dt="2025-09-24T15:09:44.874"/>
+  </p1510:revLst>
+</p1510:revInfo>
+</file>
+
 <file path=ppt/changesInfos/changesInfo1.xml><?xml version="1.0" encoding="utf-8"?>
 <pc:chgInfo xmlns:a="http://schemas.openxmlformats.org/drawingml/2006/main" xmlns:r="http://schemas.openxmlformats.org/officeDocument/2006/relationships" xmlns:ac="http://schemas.microsoft.com/office/drawing/2013/main/command" xmlns:pc="http://schemas.microsoft.com/office/powerpoint/2013/main/command">
   <pc:docChgLst>
     <pc:chgData name="Mike Phillips" userId="c10e49f1853cb2ff" providerId="LiveId" clId="{0AE09A13-BB4C-4318-92DA-755721C46758}"/>
-    <pc:docChg chg="modSld">
-      <pc:chgData name="Mike Phillips" userId="c10e49f1853cb2ff" providerId="LiveId" clId="{0AE09A13-BB4C-4318-92DA-755721C46758}" dt="2025-09-23T19:17:34.860" v="2" actId="6549"/>
+    <pc:docChg chg="undo custSel addSld delSld modSld sldOrd">
+      <pc:chgData name="Mike Phillips" userId="c10e49f1853cb2ff" providerId="LiveId" clId="{0AE09A13-BB4C-4318-92DA-755721C46758}" dt="2025-09-24T15:55:02.135" v="2449" actId="6549"/>
       <pc:docMkLst>
         <pc:docMk/>
       </pc:docMkLst>
@@ -167,6 +176,295 @@
           </ac:spMkLst>
         </pc:spChg>
       </pc:sldChg>
+      <pc:sldChg chg="modSp mod">
+        <pc:chgData name="Mike Phillips" userId="c10e49f1853cb2ff" providerId="LiveId" clId="{0AE09A13-BB4C-4318-92DA-755721C46758}" dt="2025-09-24T15:51:55.276" v="2448" actId="20577"/>
+        <pc:sldMkLst>
+          <pc:docMk/>
+          <pc:sldMk cId="0" sldId="258"/>
+        </pc:sldMkLst>
+        <pc:spChg chg="mod">
+          <ac:chgData name="Mike Phillips" userId="c10e49f1853cb2ff" providerId="LiveId" clId="{0AE09A13-BB4C-4318-92DA-755721C46758}" dt="2025-09-24T12:17:13.447" v="3" actId="1076"/>
+          <ac:spMkLst>
+            <pc:docMk/>
+            <pc:sldMk cId="0" sldId="258"/>
+            <ac:spMk id="2" creationId="{00000000-0000-0000-0000-000000000000}"/>
+          </ac:spMkLst>
+        </pc:spChg>
+        <pc:spChg chg="mod">
+          <ac:chgData name="Mike Phillips" userId="c10e49f1853cb2ff" providerId="LiveId" clId="{0AE09A13-BB4C-4318-92DA-755721C46758}" dt="2025-09-24T15:51:55.276" v="2448" actId="20577"/>
+          <ac:spMkLst>
+            <pc:docMk/>
+            <pc:sldMk cId="0" sldId="258"/>
+            <ac:spMk id="3" creationId="{00000000-0000-0000-0000-000000000000}"/>
+          </ac:spMkLst>
+        </pc:spChg>
+      </pc:sldChg>
+      <pc:sldChg chg="modSp mod">
+        <pc:chgData name="Mike Phillips" userId="c10e49f1853cb2ff" providerId="LiveId" clId="{0AE09A13-BB4C-4318-92DA-755721C46758}" dt="2025-09-24T15:55:02.135" v="2449" actId="6549"/>
+        <pc:sldMkLst>
+          <pc:docMk/>
+          <pc:sldMk cId="0" sldId="259"/>
+        </pc:sldMkLst>
+        <pc:spChg chg="mod">
+          <ac:chgData name="Mike Phillips" userId="c10e49f1853cb2ff" providerId="LiveId" clId="{0AE09A13-BB4C-4318-92DA-755721C46758}" dt="2025-09-24T12:17:26.142" v="5" actId="1076"/>
+          <ac:spMkLst>
+            <pc:docMk/>
+            <pc:sldMk cId="0" sldId="259"/>
+            <ac:spMk id="2" creationId="{00000000-0000-0000-0000-000000000000}"/>
+          </ac:spMkLst>
+        </pc:spChg>
+        <pc:spChg chg="mod">
+          <ac:chgData name="Mike Phillips" userId="c10e49f1853cb2ff" providerId="LiveId" clId="{0AE09A13-BB4C-4318-92DA-755721C46758}" dt="2025-09-24T15:55:02.135" v="2449" actId="6549"/>
+          <ac:spMkLst>
+            <pc:docMk/>
+            <pc:sldMk cId="0" sldId="259"/>
+            <ac:spMk id="3" creationId="{00000000-0000-0000-0000-000000000000}"/>
+          </ac:spMkLst>
+        </pc:spChg>
+      </pc:sldChg>
+      <pc:sldChg chg="modSp mod">
+        <pc:chgData name="Mike Phillips" userId="c10e49f1853cb2ff" providerId="LiveId" clId="{0AE09A13-BB4C-4318-92DA-755721C46758}" dt="2025-09-24T13:31:45.778" v="268" actId="255"/>
+        <pc:sldMkLst>
+          <pc:docMk/>
+          <pc:sldMk cId="0" sldId="260"/>
+        </pc:sldMkLst>
+        <pc:spChg chg="mod">
+          <ac:chgData name="Mike Phillips" userId="c10e49f1853cb2ff" providerId="LiveId" clId="{0AE09A13-BB4C-4318-92DA-755721C46758}" dt="2025-09-24T13:31:45.778" v="268" actId="255"/>
+          <ac:spMkLst>
+            <pc:docMk/>
+            <pc:sldMk cId="0" sldId="260"/>
+            <ac:spMk id="2" creationId="{00000000-0000-0000-0000-000000000000}"/>
+          </ac:spMkLst>
+        </pc:spChg>
+      </pc:sldChg>
+      <pc:sldChg chg="modSp mod ord">
+        <pc:chgData name="Mike Phillips" userId="c10e49f1853cb2ff" providerId="LiveId" clId="{0AE09A13-BB4C-4318-92DA-755721C46758}" dt="2025-09-24T15:03:05.461" v="1485" actId="20577"/>
+        <pc:sldMkLst>
+          <pc:docMk/>
+          <pc:sldMk cId="0" sldId="261"/>
+        </pc:sldMkLst>
+        <pc:spChg chg="mod">
+          <ac:chgData name="Mike Phillips" userId="c10e49f1853cb2ff" providerId="LiveId" clId="{0AE09A13-BB4C-4318-92DA-755721C46758}" dt="2025-09-24T12:17:41.467" v="7" actId="1076"/>
+          <ac:spMkLst>
+            <pc:docMk/>
+            <pc:sldMk cId="0" sldId="261"/>
+            <ac:spMk id="2" creationId="{00000000-0000-0000-0000-000000000000}"/>
+          </ac:spMkLst>
+        </pc:spChg>
+        <pc:spChg chg="mod">
+          <ac:chgData name="Mike Phillips" userId="c10e49f1853cb2ff" providerId="LiveId" clId="{0AE09A13-BB4C-4318-92DA-755721C46758}" dt="2025-09-24T15:03:05.461" v="1485" actId="20577"/>
+          <ac:spMkLst>
+            <pc:docMk/>
+            <pc:sldMk cId="0" sldId="261"/>
+            <ac:spMk id="3" creationId="{00000000-0000-0000-0000-000000000000}"/>
+          </ac:spMkLst>
+        </pc:spChg>
+      </pc:sldChg>
+      <pc:sldChg chg="modSp mod">
+        <pc:chgData name="Mike Phillips" userId="c10e49f1853cb2ff" providerId="LiveId" clId="{0AE09A13-BB4C-4318-92DA-755721C46758}" dt="2025-09-24T15:04:09.528" v="1574" actId="20577"/>
+        <pc:sldMkLst>
+          <pc:docMk/>
+          <pc:sldMk cId="0" sldId="262"/>
+        </pc:sldMkLst>
+        <pc:spChg chg="mod">
+          <ac:chgData name="Mike Phillips" userId="c10e49f1853cb2ff" providerId="LiveId" clId="{0AE09A13-BB4C-4318-92DA-755721C46758}" dt="2025-09-24T12:17:50.418" v="9" actId="1076"/>
+          <ac:spMkLst>
+            <pc:docMk/>
+            <pc:sldMk cId="0" sldId="262"/>
+            <ac:spMk id="2" creationId="{00000000-0000-0000-0000-000000000000}"/>
+          </ac:spMkLst>
+        </pc:spChg>
+        <pc:spChg chg="mod">
+          <ac:chgData name="Mike Phillips" userId="c10e49f1853cb2ff" providerId="LiveId" clId="{0AE09A13-BB4C-4318-92DA-755721C46758}" dt="2025-09-24T15:04:09.528" v="1574" actId="20577"/>
+          <ac:spMkLst>
+            <pc:docMk/>
+            <pc:sldMk cId="0" sldId="262"/>
+            <ac:spMk id="3" creationId="{00000000-0000-0000-0000-000000000000}"/>
+          </ac:spMkLst>
+        </pc:spChg>
+      </pc:sldChg>
+      <pc:sldChg chg="modSp mod">
+        <pc:chgData name="Mike Phillips" userId="c10e49f1853cb2ff" providerId="LiveId" clId="{0AE09A13-BB4C-4318-92DA-755721C46758}" dt="2025-09-24T15:05:24.934" v="1681" actId="20577"/>
+        <pc:sldMkLst>
+          <pc:docMk/>
+          <pc:sldMk cId="0" sldId="263"/>
+        </pc:sldMkLst>
+        <pc:spChg chg="mod">
+          <ac:chgData name="Mike Phillips" userId="c10e49f1853cb2ff" providerId="LiveId" clId="{0AE09A13-BB4C-4318-92DA-755721C46758}" dt="2025-09-24T12:17:59.145" v="11" actId="1076"/>
+          <ac:spMkLst>
+            <pc:docMk/>
+            <pc:sldMk cId="0" sldId="263"/>
+            <ac:spMk id="2" creationId="{00000000-0000-0000-0000-000000000000}"/>
+          </ac:spMkLst>
+        </pc:spChg>
+        <pc:spChg chg="mod">
+          <ac:chgData name="Mike Phillips" userId="c10e49f1853cb2ff" providerId="LiveId" clId="{0AE09A13-BB4C-4318-92DA-755721C46758}" dt="2025-09-24T15:05:24.934" v="1681" actId="20577"/>
+          <ac:spMkLst>
+            <pc:docMk/>
+            <pc:sldMk cId="0" sldId="263"/>
+            <ac:spMk id="3" creationId="{00000000-0000-0000-0000-000000000000}"/>
+          </ac:spMkLst>
+        </pc:spChg>
+      </pc:sldChg>
+      <pc:sldChg chg="modSp mod">
+        <pc:chgData name="Mike Phillips" userId="c10e49f1853cb2ff" providerId="LiveId" clId="{0AE09A13-BB4C-4318-92DA-755721C46758}" dt="2025-09-24T15:05:48.934" v="1711" actId="20577"/>
+        <pc:sldMkLst>
+          <pc:docMk/>
+          <pc:sldMk cId="0" sldId="265"/>
+        </pc:sldMkLst>
+        <pc:spChg chg="mod">
+          <ac:chgData name="Mike Phillips" userId="c10e49f1853cb2ff" providerId="LiveId" clId="{0AE09A13-BB4C-4318-92DA-755721C46758}" dt="2025-09-24T12:18:27.995" v="17" actId="122"/>
+          <ac:spMkLst>
+            <pc:docMk/>
+            <pc:sldMk cId="0" sldId="265"/>
+            <ac:spMk id="2" creationId="{00000000-0000-0000-0000-000000000000}"/>
+          </ac:spMkLst>
+        </pc:spChg>
+        <pc:spChg chg="mod">
+          <ac:chgData name="Mike Phillips" userId="c10e49f1853cb2ff" providerId="LiveId" clId="{0AE09A13-BB4C-4318-92DA-755721C46758}" dt="2025-09-24T15:05:48.934" v="1711" actId="20577"/>
+          <ac:spMkLst>
+            <pc:docMk/>
+            <pc:sldMk cId="0" sldId="265"/>
+            <ac:spMk id="3" creationId="{00000000-0000-0000-0000-000000000000}"/>
+          </ac:spMkLst>
+        </pc:spChg>
+      </pc:sldChg>
+      <pc:sldChg chg="modSp mod ord">
+        <pc:chgData name="Mike Phillips" userId="c10e49f1853cb2ff" providerId="LiveId" clId="{0AE09A13-BB4C-4318-92DA-755721C46758}" dt="2025-09-24T15:11:35.270" v="2077" actId="5793"/>
+        <pc:sldMkLst>
+          <pc:docMk/>
+          <pc:sldMk cId="0" sldId="266"/>
+        </pc:sldMkLst>
+        <pc:spChg chg="mod">
+          <ac:chgData name="Mike Phillips" userId="c10e49f1853cb2ff" providerId="LiveId" clId="{0AE09A13-BB4C-4318-92DA-755721C46758}" dt="2025-09-24T13:48:41.609" v="605" actId="6549"/>
+          <ac:spMkLst>
+            <pc:docMk/>
+            <pc:sldMk cId="0" sldId="266"/>
+            <ac:spMk id="2" creationId="{00000000-0000-0000-0000-000000000000}"/>
+          </ac:spMkLst>
+        </pc:spChg>
+        <pc:spChg chg="mod">
+          <ac:chgData name="Mike Phillips" userId="c10e49f1853cb2ff" providerId="LiveId" clId="{0AE09A13-BB4C-4318-92DA-755721C46758}" dt="2025-09-24T15:11:35.270" v="2077" actId="5793"/>
+          <ac:spMkLst>
+            <pc:docMk/>
+            <pc:sldMk cId="0" sldId="266"/>
+            <ac:spMk id="3" creationId="{00000000-0000-0000-0000-000000000000}"/>
+          </ac:spMkLst>
+        </pc:spChg>
+      </pc:sldChg>
+      <pc:sldChg chg="modSp del mod">
+        <pc:chgData name="Mike Phillips" userId="c10e49f1853cb2ff" providerId="LiveId" clId="{0AE09A13-BB4C-4318-92DA-755721C46758}" dt="2025-09-24T15:08:03.951" v="1920" actId="47"/>
+        <pc:sldMkLst>
+          <pc:docMk/>
+          <pc:sldMk cId="0" sldId="267"/>
+        </pc:sldMkLst>
+        <pc:spChg chg="mod">
+          <ac:chgData name="Mike Phillips" userId="c10e49f1853cb2ff" providerId="LiveId" clId="{0AE09A13-BB4C-4318-92DA-755721C46758}" dt="2025-09-24T12:18:48.170" v="20" actId="1076"/>
+          <ac:spMkLst>
+            <pc:docMk/>
+            <pc:sldMk cId="0" sldId="267"/>
+            <ac:spMk id="2" creationId="{00000000-0000-0000-0000-000000000000}"/>
+          </ac:spMkLst>
+        </pc:spChg>
+        <pc:spChg chg="mod">
+          <ac:chgData name="Mike Phillips" userId="c10e49f1853cb2ff" providerId="LiveId" clId="{0AE09A13-BB4C-4318-92DA-755721C46758}" dt="2025-09-24T15:07:28.829" v="1882" actId="21"/>
+          <ac:spMkLst>
+            <pc:docMk/>
+            <pc:sldMk cId="0" sldId="267"/>
+            <ac:spMk id="3" creationId="{00000000-0000-0000-0000-000000000000}"/>
+          </ac:spMkLst>
+        </pc:spChg>
+      </pc:sldChg>
+      <pc:sldChg chg="modSp mod ord">
+        <pc:chgData name="Mike Phillips" userId="c10e49f1853cb2ff" providerId="LiveId" clId="{0AE09A13-BB4C-4318-92DA-755721C46758}" dt="2025-09-24T15:12:25.716" v="2113" actId="20577"/>
+        <pc:sldMkLst>
+          <pc:docMk/>
+          <pc:sldMk cId="0" sldId="268"/>
+        </pc:sldMkLst>
+        <pc:spChg chg="mod">
+          <ac:chgData name="Mike Phillips" userId="c10e49f1853cb2ff" providerId="LiveId" clId="{0AE09A13-BB4C-4318-92DA-755721C46758}" dt="2025-09-24T15:12:14.678" v="2102" actId="20577"/>
+          <ac:spMkLst>
+            <pc:docMk/>
+            <pc:sldMk cId="0" sldId="268"/>
+            <ac:spMk id="2" creationId="{00000000-0000-0000-0000-000000000000}"/>
+          </ac:spMkLst>
+        </pc:spChg>
+        <pc:spChg chg="mod">
+          <ac:chgData name="Mike Phillips" userId="c10e49f1853cb2ff" providerId="LiveId" clId="{0AE09A13-BB4C-4318-92DA-755721C46758}" dt="2025-09-24T15:12:25.716" v="2113" actId="20577"/>
+          <ac:spMkLst>
+            <pc:docMk/>
+            <pc:sldMk cId="0" sldId="268"/>
+            <ac:spMk id="3" creationId="{00000000-0000-0000-0000-000000000000}"/>
+          </ac:spMkLst>
+        </pc:spChg>
+      </pc:sldChg>
+      <pc:sldChg chg="addSp delSp new del mod">
+        <pc:chgData name="Mike Phillips" userId="c10e49f1853cb2ff" providerId="LiveId" clId="{0AE09A13-BB4C-4318-92DA-755721C46758}" dt="2025-09-24T13:36:59.088" v="308" actId="680"/>
+        <pc:sldMkLst>
+          <pc:docMk/>
+          <pc:sldMk cId="403034093" sldId="269"/>
+        </pc:sldMkLst>
+        <pc:spChg chg="add del">
+          <ac:chgData name="Mike Phillips" userId="c10e49f1853cb2ff" providerId="LiveId" clId="{0AE09A13-BB4C-4318-92DA-755721C46758}" dt="2025-09-24T13:36:58.487" v="307" actId="22"/>
+          <ac:spMkLst>
+            <pc:docMk/>
+            <pc:sldMk cId="403034093" sldId="269"/>
+            <ac:spMk id="3" creationId="{0D360D05-E2B3-2765-1671-4BF02D09EDD5}"/>
+          </ac:spMkLst>
+        </pc:spChg>
+      </pc:sldChg>
+      <pc:sldChg chg="add del">
+        <pc:chgData name="Mike Phillips" userId="c10e49f1853cb2ff" providerId="LiveId" clId="{0AE09A13-BB4C-4318-92DA-755721C46758}" dt="2025-09-24T13:44:52.115" v="592" actId="47"/>
+        <pc:sldMkLst>
+          <pc:docMk/>
+          <pc:sldMk cId="682126085" sldId="269"/>
+        </pc:sldMkLst>
+      </pc:sldChg>
+      <pc:sldChg chg="add del">
+        <pc:chgData name="Mike Phillips" userId="c10e49f1853cb2ff" providerId="LiveId" clId="{0AE09A13-BB4C-4318-92DA-755721C46758}" dt="2025-09-24T13:44:53.620" v="593" actId="47"/>
+        <pc:sldMkLst>
+          <pc:docMk/>
+          <pc:sldMk cId="2707828271" sldId="270"/>
+        </pc:sldMkLst>
+      </pc:sldChg>
+      <pc:sldChg chg="modSp add mod">
+        <pc:chgData name="Mike Phillips" userId="c10e49f1853cb2ff" providerId="LiveId" clId="{0AE09A13-BB4C-4318-92DA-755721C46758}" dt="2025-09-24T14:54:19.557" v="904" actId="6549"/>
+        <pc:sldMkLst>
+          <pc:docMk/>
+          <pc:sldMk cId="3577927028" sldId="271"/>
+        </pc:sldMkLst>
+        <pc:spChg chg="mod">
+          <ac:chgData name="Mike Phillips" userId="c10e49f1853cb2ff" providerId="LiveId" clId="{0AE09A13-BB4C-4318-92DA-755721C46758}" dt="2025-09-24T13:40:35.021" v="341" actId="20577"/>
+          <ac:spMkLst>
+            <pc:docMk/>
+            <pc:sldMk cId="3577927028" sldId="271"/>
+            <ac:spMk id="2" creationId="{C5FE5DEF-83A5-C26B-18E9-4E810F6F5CEC}"/>
+          </ac:spMkLst>
+        </pc:spChg>
+        <pc:spChg chg="mod">
+          <ac:chgData name="Mike Phillips" userId="c10e49f1853cb2ff" providerId="LiveId" clId="{0AE09A13-BB4C-4318-92DA-755721C46758}" dt="2025-09-24T14:54:19.557" v="904" actId="6549"/>
+          <ac:spMkLst>
+            <pc:docMk/>
+            <pc:sldMk cId="3577927028" sldId="271"/>
+            <ac:spMk id="3" creationId="{AF8F5643-95D2-9C85-5EA6-07C6D2800BC8}"/>
+          </ac:spMkLst>
+        </pc:spChg>
+      </pc:sldChg>
+      <pc:sldChg chg="modSp add mod">
+        <pc:chgData name="Mike Phillips" userId="c10e49f1853cb2ff" providerId="LiveId" clId="{0AE09A13-BB4C-4318-92DA-755721C46758}" dt="2025-09-24T15:00:26.053" v="1239" actId="20577"/>
+        <pc:sldMkLst>
+          <pc:docMk/>
+          <pc:sldMk cId="138084110" sldId="272"/>
+        </pc:sldMkLst>
+        <pc:spChg chg="mod">
+          <ac:chgData name="Mike Phillips" userId="c10e49f1853cb2ff" providerId="LiveId" clId="{0AE09A13-BB4C-4318-92DA-755721C46758}" dt="2025-09-24T15:00:26.053" v="1239" actId="20577"/>
+          <ac:spMkLst>
+            <pc:docMk/>
+            <pc:sldMk cId="138084110" sldId="272"/>
+            <ac:spMk id="3" creationId="{032A6325-1901-923A-1748-E2B0D92EE9A6}"/>
+          </ac:spMkLst>
+        </pc:spChg>
+      </pc:sldChg>
     </pc:docChg>
   </pc:docChgLst>
 </pc:chgInfo>
@@ -351,7 +649,7 @@
           <a:p>
             <a:fld id="{5BCAD085-E8A6-8845-BD4E-CB4CCA059FC4}" type="datetimeFigureOut">
               <a:rPr lang="en-US" smtClean="0"/>
-              <a:t>9/23/2025</a:t>
+              <a:t>9/24/2025</a:t>
             </a:fld>
             <a:endParaRPr lang="en-US"/>
           </a:p>
@@ -519,7 +817,7 @@
           <a:p>
             <a:fld id="{5BCAD085-E8A6-8845-BD4E-CB4CCA059FC4}" type="datetimeFigureOut">
               <a:rPr lang="en-US" smtClean="0"/>
-              <a:t>9/23/2025</a:t>
+              <a:t>9/24/2025</a:t>
             </a:fld>
             <a:endParaRPr lang="en-US"/>
           </a:p>
@@ -697,7 +995,7 @@
           <a:p>
             <a:fld id="{5BCAD085-E8A6-8845-BD4E-CB4CCA059FC4}" type="datetimeFigureOut">
               <a:rPr lang="en-US" smtClean="0"/>
-              <a:t>9/23/2025</a:t>
+              <a:t>9/24/2025</a:t>
             </a:fld>
             <a:endParaRPr lang="en-US"/>
           </a:p>
@@ -865,7 +1163,7 @@
           <a:p>
             <a:fld id="{5BCAD085-E8A6-8845-BD4E-CB4CCA059FC4}" type="datetimeFigureOut">
               <a:rPr lang="en-US" smtClean="0"/>
-              <a:t>9/23/2025</a:t>
+              <a:t>9/24/2025</a:t>
             </a:fld>
             <a:endParaRPr lang="en-US"/>
           </a:p>
@@ -1110,7 +1408,7 @@
           <a:p>
             <a:fld id="{5BCAD085-E8A6-8845-BD4E-CB4CCA059FC4}" type="datetimeFigureOut">
               <a:rPr lang="en-US" smtClean="0"/>
-              <a:t>9/23/2025</a:t>
+              <a:t>9/24/2025</a:t>
             </a:fld>
             <a:endParaRPr lang="en-US"/>
           </a:p>
@@ -1395,7 +1693,7 @@
           <a:p>
             <a:fld id="{5BCAD085-E8A6-8845-BD4E-CB4CCA059FC4}" type="datetimeFigureOut">
               <a:rPr lang="en-US" smtClean="0"/>
-              <a:t>9/23/2025</a:t>
+              <a:t>9/24/2025</a:t>
             </a:fld>
             <a:endParaRPr lang="en-US"/>
           </a:p>
@@ -1814,7 +2112,7 @@
           <a:p>
             <a:fld id="{5BCAD085-E8A6-8845-BD4E-CB4CCA059FC4}" type="datetimeFigureOut">
               <a:rPr lang="en-US" smtClean="0"/>
-              <a:t>9/23/2025</a:t>
+              <a:t>9/24/2025</a:t>
             </a:fld>
             <a:endParaRPr lang="en-US"/>
           </a:p>
@@ -1931,7 +2229,7 @@
           <a:p>
             <a:fld id="{5BCAD085-E8A6-8845-BD4E-CB4CCA059FC4}" type="datetimeFigureOut">
               <a:rPr lang="en-US" smtClean="0"/>
-              <a:t>9/23/2025</a:t>
+              <a:t>9/24/2025</a:t>
             </a:fld>
             <a:endParaRPr lang="en-US"/>
           </a:p>
@@ -2026,7 +2324,7 @@
           <a:p>
             <a:fld id="{5BCAD085-E8A6-8845-BD4E-CB4CCA059FC4}" type="datetimeFigureOut">
               <a:rPr lang="en-US" smtClean="0"/>
-              <a:t>9/23/2025</a:t>
+              <a:t>9/24/2025</a:t>
             </a:fld>
             <a:endParaRPr lang="en-US"/>
           </a:p>
@@ -2301,7 +2599,7 @@
           <a:p>
             <a:fld id="{5BCAD085-E8A6-8845-BD4E-CB4CCA059FC4}" type="datetimeFigureOut">
               <a:rPr lang="en-US" smtClean="0"/>
-              <a:t>9/23/2025</a:t>
+              <a:t>9/24/2025</a:t>
             </a:fld>
             <a:endParaRPr lang="en-US"/>
           </a:p>
@@ -2553,7 +2851,7 @@
           <a:p>
             <a:fld id="{5BCAD085-E8A6-8845-BD4E-CB4CCA059FC4}" type="datetimeFigureOut">
               <a:rPr lang="en-US" smtClean="0"/>
-              <a:t>9/23/2025</a:t>
+              <a:t>9/24/2025</a:t>
             </a:fld>
             <a:endParaRPr lang="en-US"/>
           </a:p>
@@ -2764,7 +3062,7 @@
           <a:p>
             <a:fld id="{5BCAD085-E8A6-8845-BD4E-CB4CCA059FC4}" type="datetimeFigureOut">
               <a:rPr lang="en-US" smtClean="0"/>
-              <a:t>9/23/2025</a:t>
+              <a:t>9/24/2025</a:t>
             </a:fld>
             <a:endParaRPr lang="en-US"/>
           </a:p>
@@ -3236,7 +3534,7 @@
         </p:nvSpPr>
         <p:spPr>
           <a:xfrm>
-            <a:off x="457200" y="457200"/>
+            <a:off x="457200" y="0"/>
             <a:ext cx="11274552" cy="914400"/>
           </a:xfrm>
           <a:prstGeom prst="rect">
@@ -3250,7 +3548,7 @@
           </a:bodyPr>
           <a:lstStyle/>
           <a:p>
-            <a:endParaRPr/>
+            <a:endParaRPr dirty="0"/>
           </a:p>
           <a:p>
             <a:pPr>
@@ -3262,7 +3560,8 @@
               </a:defRPr>
             </a:pPr>
             <a:r>
-              <a:t>Three approaches to calculating fines are under consideration</a:t>
+              <a:rPr dirty="0"/>
+              <a:t>How do Metro crews compare to contractors?</a:t>
             </a:r>
           </a:p>
         </p:txBody>
@@ -3275,8 +3574,8 @@
         </p:nvSpPr>
         <p:spPr>
           <a:xfrm>
-            <a:off x="457200" y="1371600"/>
-            <a:ext cx="11274552" cy="5029200"/>
+            <a:off x="457200" y="914400"/>
+            <a:ext cx="11274552" cy="5447645"/>
           </a:xfrm>
           <a:prstGeom prst="rect">
             <a:avLst/>
@@ -3289,7 +3588,7 @@
           </a:bodyPr>
           <a:lstStyle/>
           <a:p>
-            <a:endParaRPr/>
+            <a:endParaRPr dirty="0"/>
           </a:p>
           <a:p>
             <a:pPr>
@@ -3301,13 +3600,161 @@
               </a:defRPr>
             </a:pPr>
             <a:r>
-              <a:t>Current system vs. two alternatives (6-month rolling window models).</a:t>
-            </a:r>
-            <a:br/>
-            <a:br/>
-            <a:r>
-              <a:t>[Insert: Comparison table of rules + fine totals]</a:t>
-            </a:r>
+              <a:rPr dirty="0"/>
+              <a:t>Exploring whether Metro performs better than Red River and Waste Ind.</a:t>
+            </a:r>
+            <a:br>
+              <a:rPr dirty="0"/>
+            </a:br>
+            <a:br>
+              <a:rPr dirty="0"/>
+            </a:br>
+            <a:r>
+              <a:rPr dirty="0"/>
+              <a:t>[</a:t>
+            </a:r>
+            <a:r>
+              <a:rPr lang="en-US" dirty="0"/>
+              <a:t>Chris to </a:t>
+            </a:r>
+            <a:r>
+              <a:rPr dirty="0"/>
+              <a:t>Insert: Bar chart of missed pickups per hauler</a:t>
+            </a:r>
+            <a:r>
+              <a:rPr lang="en-US" dirty="0"/>
+              <a:t> or anything else that answers these three questions] {This can be multiple slides}</a:t>
+            </a:r>
+          </a:p>
+          <a:p>
+            <a:pPr>
+              <a:defRPr sz="2200">
+                <a:solidFill>
+                  <a:srgbClr val="282828"/>
+                </a:solidFill>
+                <a:latin typeface="Segoe UI"/>
+              </a:defRPr>
+            </a:pPr>
+            <a:endParaRPr lang="en-US" dirty="0"/>
+          </a:p>
+          <a:p>
+            <a:pPr>
+              <a:defRPr sz="2200">
+                <a:solidFill>
+                  <a:srgbClr val="282828"/>
+                </a:solidFill>
+                <a:latin typeface="Segoe UI"/>
+              </a:defRPr>
+            </a:pPr>
+            <a:endParaRPr lang="en-US" dirty="0"/>
+          </a:p>
+          <a:p>
+            <a:pPr>
+              <a:defRPr sz="2200">
+                <a:solidFill>
+                  <a:srgbClr val="282828"/>
+                </a:solidFill>
+                <a:latin typeface="Segoe UI"/>
+              </a:defRPr>
+            </a:pPr>
+            <a:r>
+              <a:rPr lang="en-US" dirty="0"/>
+              <a:t>How do metro crews compare to the contractor's performance?</a:t>
+            </a:r>
+          </a:p>
+          <a:p>
+            <a:pPr>
+              <a:defRPr sz="2200">
+                <a:solidFill>
+                  <a:srgbClr val="282828"/>
+                </a:solidFill>
+                <a:latin typeface="Segoe UI"/>
+              </a:defRPr>
+            </a:pPr>
+            <a:endParaRPr lang="en-US" dirty="0"/>
+          </a:p>
+          <a:p>
+            <a:pPr>
+              <a:defRPr sz="2200">
+                <a:solidFill>
+                  <a:srgbClr val="282828"/>
+                </a:solidFill>
+                <a:latin typeface="Segoe UI"/>
+              </a:defRPr>
+            </a:pPr>
+            <a:r>
+              <a:rPr lang="en-US" sz="2200" dirty="0"/>
+              <a:t>How much does each trash hauler owe?</a:t>
+            </a:r>
+          </a:p>
+          <a:p>
+            <a:pPr>
+              <a:defRPr sz="2200">
+                <a:solidFill>
+                  <a:srgbClr val="282828"/>
+                </a:solidFill>
+                <a:latin typeface="Segoe UI"/>
+              </a:defRPr>
+            </a:pPr>
+            <a:endParaRPr lang="en-US" sz="2200" dirty="0"/>
+          </a:p>
+          <a:p>
+            <a:pPr>
+              <a:defRPr sz="2200">
+                <a:solidFill>
+                  <a:srgbClr val="282828"/>
+                </a:solidFill>
+                <a:latin typeface="Segoe UI"/>
+              </a:defRPr>
+            </a:pPr>
+            <a:r>
+              <a:rPr lang="en-US" sz="2200" dirty="0"/>
+              <a:t>What were to total missed pickup by route?</a:t>
+            </a:r>
+          </a:p>
+          <a:p>
+            <a:pPr>
+              <a:defRPr sz="2200">
+                <a:solidFill>
+                  <a:srgbClr val="282828"/>
+                </a:solidFill>
+                <a:latin typeface="Segoe UI"/>
+              </a:defRPr>
+            </a:pPr>
+            <a:endParaRPr lang="en-US" sz="2200" dirty="0"/>
+          </a:p>
+          <a:p>
+            <a:pPr>
+              <a:defRPr sz="2200">
+                <a:solidFill>
+                  <a:srgbClr val="282828"/>
+                </a:solidFill>
+                <a:latin typeface="Segoe UI"/>
+              </a:defRPr>
+            </a:pPr>
+            <a:endParaRPr lang="en-US" dirty="0"/>
+          </a:p>
+          <a:p>
+            <a:pPr>
+              <a:defRPr sz="2200">
+                <a:solidFill>
+                  <a:srgbClr val="282828"/>
+                </a:solidFill>
+                <a:latin typeface="Segoe UI"/>
+              </a:defRPr>
+            </a:pPr>
+            <a:endParaRPr lang="en-US" dirty="0"/>
+          </a:p>
+          <a:p>
+            <a:pPr>
+              <a:defRPr sz="2200">
+                <a:solidFill>
+                  <a:srgbClr val="282828"/>
+                </a:solidFill>
+                <a:latin typeface="Segoe UI"/>
+              </a:defRPr>
+            </a:pPr>
+            <a:endParaRPr dirty="0"/>
           </a:p>
         </p:txBody>
       </p:sp>
@@ -3344,8 +3791,8 @@
         </p:nvSpPr>
         <p:spPr>
           <a:xfrm>
-            <a:off x="457200" y="457200"/>
-            <a:ext cx="11274552" cy="914400"/>
+            <a:off x="0" y="2743200"/>
+            <a:ext cx="12188952" cy="1371600"/>
           </a:xfrm>
           <a:prstGeom prst="rect">
             <a:avLst/>
@@ -3358,11 +3805,12 @@
           </a:bodyPr>
           <a:lstStyle/>
           <a:p>
+            <a:pPr algn="l"/>
             <a:endParaRPr/>
           </a:p>
           <a:p>
             <a:pPr>
-              <a:defRPr sz="3200" b="1">
+              <a:defRPr sz="6000" b="1">
                 <a:solidFill>
                   <a:srgbClr val="003366"/>
                 </a:solidFill>
@@ -3370,51 +3818,7 @@
               </a:defRPr>
             </a:pPr>
             <a:r>
-              <a:t>Alternative fine structures produce very different outcomes</a:t>
-            </a:r>
-          </a:p>
-        </p:txBody>
-      </p:sp>
-      <p:sp>
-        <p:nvSpPr>
-          <p:cNvPr id="3" name="TextBox 2"/>
-          <p:cNvSpPr txBox="1"/>
-          <p:nvPr/>
-        </p:nvSpPr>
-        <p:spPr>
-          <a:xfrm>
-            <a:off x="457200" y="1371600"/>
-            <a:ext cx="11274552" cy="5029200"/>
-          </a:xfrm>
-          <a:prstGeom prst="rect">
-            <a:avLst/>
-          </a:prstGeom>
-          <a:noFill/>
-        </p:spPr>
-        <p:txBody>
-          <a:bodyPr wrap="square">
-            <a:spAutoFit/>
-          </a:bodyPr>
-          <a:lstStyle/>
-          <a:p>
-            <a:endParaRPr/>
-          </a:p>
-          <a:p>
-            <a:pPr>
-              <a:defRPr sz="2200">
-                <a:solidFill>
-                  <a:srgbClr val="282828"/>
-                </a:solidFill>
-                <a:latin typeface="Segoe UI"/>
-              </a:defRPr>
-            </a:pPr>
-            <a:r>
-              <a:t>Six-month rolling window methods change fine totals and resident accountability.</a:t>
-            </a:r>
-            <a:br/>
-            <a:br/>
-            <a:r>
-              <a:t>[Insert: Bar chart comparing fines under each method]</a:t>
+              <a:t>RESOLUTION</a:t>
             </a:r>
           </a:p>
         </p:txBody>
@@ -3452,8 +3856,8 @@
         </p:nvSpPr>
         <p:spPr>
           <a:xfrm>
-            <a:off x="457200" y="457200"/>
-            <a:ext cx="11274552" cy="914400"/>
+            <a:off x="457200" y="44605"/>
+            <a:ext cx="11274552" cy="1354217"/>
           </a:xfrm>
           <a:prstGeom prst="rect">
             <a:avLst/>
@@ -3461,15 +3865,15 @@
           <a:noFill/>
         </p:spPr>
         <p:txBody>
-          <a:bodyPr wrap="none">
+          <a:bodyPr wrap="square">
             <a:spAutoFit/>
           </a:bodyPr>
           <a:lstStyle/>
           <a:p>
-            <a:endParaRPr/>
-          </a:p>
-          <a:p>
-            <a:pPr>
+            <a:endParaRPr dirty="0"/>
+          </a:p>
+          <a:p>
+            <a:pPr algn="ctr">
               <a:defRPr sz="3200" b="1">
                 <a:solidFill>
                   <a:srgbClr val="003366"/>
@@ -3478,7 +3882,15 @@
               </a:defRPr>
             </a:pPr>
             <a:r>
-              <a:t>Improving service delivery requires more than fines</a:t>
+              <a:rPr dirty="0"/>
+              <a:t>Three approaches to calculating fines</a:t>
+            </a:r>
+            <a:br>
+              <a:rPr lang="en-US" dirty="0"/>
+            </a:br>
+            <a:r>
+              <a:rPr dirty="0"/>
+              <a:t>are under consideration</a:t>
             </a:r>
           </a:p>
         </p:txBody>
@@ -3492,7 +3904,7 @@
         <p:spPr>
           <a:xfrm>
             <a:off x="457200" y="1371600"/>
-            <a:ext cx="11274552" cy="5029200"/>
+            <a:ext cx="11274552" cy="4093428"/>
           </a:xfrm>
           <a:prstGeom prst="rect">
             <a:avLst/>
@@ -3505,7 +3917,49 @@
           </a:bodyPr>
           <a:lstStyle/>
           <a:p>
-            <a:endParaRPr/>
+            <a:endParaRPr dirty="0"/>
+          </a:p>
+          <a:p>
+            <a:r>
+              <a:rPr lang="en-US" dirty="0"/>
+              <a:t>[Carolyn to describe c</a:t>
+            </a:r>
+            <a:r>
+              <a:rPr dirty="0"/>
+              <a:t>urrent system vs. two alternatives (6-month rolling window models).</a:t>
+            </a:r>
+            <a:r>
+              <a:rPr lang="en-US" dirty="0"/>
+              <a:t>]</a:t>
+            </a:r>
+            <a:br>
+              <a:rPr dirty="0"/>
+            </a:br>
+            <a:br>
+              <a:rPr dirty="0"/>
+            </a:br>
+            <a:r>
+              <a:rPr lang="en-US" b="1" dirty="0"/>
+              <a:t>Alternative Method 1:</a:t>
+            </a:r>
+          </a:p>
+          <a:p>
+            <a:r>
+              <a:rPr lang="en-US" dirty="0"/>
+              <a:t>For each address, if there are three or more missed pickups within a 180-day period, damages of $1500 will be charged. (A fine will be levied every time three unique missed pickup dates occur within a six-month period for a single address.)</a:t>
+            </a:r>
+          </a:p>
+          <a:p>
+            <a:r>
+              <a:rPr lang="en-US" b="1" dirty="0"/>
+              <a:t>Alternative Method 2:</a:t>
+            </a:r>
+          </a:p>
+          <a:p>
+            <a:r>
+              <a:rPr lang="en-US" dirty="0"/>
+              <a:t>This method also considers the six-month window like Alternative Method 1, but each date can only be used once to support a fine. How will this difference impact the fines levied? (Example: If Jan 1st, Mar 3rd, Apr 8th, and Aug 9th were the only four dates a trash pickup was missed, the original method would result in $3000 in fines [Jan, Mar, Apr, and also Mar, Apr, Aug]. However, this updated method would only result in $1500 because neither Mar nor Apr can be used for another fine since they were already used.)</a:t>
+            </a:r>
           </a:p>
           <a:p>
             <a:pPr>
@@ -3516,14 +3970,7 @@
                 <a:latin typeface="Segoe UI"/>
               </a:defRPr>
             </a:pPr>
-            <a:r>
-              <a:t>Data-driven monitoring + performance dashboards could reduce repeat incidents.</a:t>
-            </a:r>
-            <a:br/>
-            <a:br/>
-            <a:r>
-              <a:t>[Insert: Dashboard concept with KPIs]</a:t>
-            </a:r>
+            <a:endParaRPr dirty="0"/>
           </a:p>
         </p:txBody>
       </p:sp>
@@ -3560,8 +4007,8 @@
         </p:nvSpPr>
         <p:spPr>
           <a:xfrm>
-            <a:off x="457200" y="457200"/>
-            <a:ext cx="11274552" cy="914400"/>
+            <a:off x="457137" y="0"/>
+            <a:ext cx="11274552" cy="1354217"/>
           </a:xfrm>
           <a:prstGeom prst="rect">
             <a:avLst/>
@@ -3569,12 +4016,12 @@
           <a:noFill/>
         </p:spPr>
         <p:txBody>
-          <a:bodyPr wrap="none">
+          <a:bodyPr wrap="square">
             <a:spAutoFit/>
           </a:bodyPr>
           <a:lstStyle/>
           <a:p>
-            <a:endParaRPr/>
+            <a:endParaRPr dirty="0"/>
           </a:p>
           <a:p>
             <a:pPr>
@@ -3586,7 +4033,16 @@
               </a:defRPr>
             </a:pPr>
             <a:r>
-              <a:t>Key takeaways for Nashville officials and stakeholders</a:t>
+              <a:rPr dirty="0"/>
+              <a:t>Alternative fine structures </a:t>
+            </a:r>
+            <a:r>
+              <a:rPr lang="en-US" dirty="0"/>
+              <a:t>could </a:t>
+            </a:r>
+            <a:r>
+              <a:rPr dirty="0"/>
+              <a:t>produce very different outcomes</a:t>
             </a:r>
           </a:p>
         </p:txBody>
@@ -3599,8 +4055,8 @@
         </p:nvSpPr>
         <p:spPr>
           <a:xfrm>
-            <a:off x="457200" y="1371600"/>
-            <a:ext cx="11274552" cy="5029200"/>
+            <a:off x="457136" y="1354217"/>
+            <a:ext cx="11274552" cy="4093428"/>
           </a:xfrm>
           <a:prstGeom prst="rect">
             <a:avLst/>
@@ -3613,7 +4069,7 @@
           </a:bodyPr>
           <a:lstStyle/>
           <a:p>
-            <a:endParaRPr/>
+            <a:endParaRPr dirty="0"/>
           </a:p>
           <a:p>
             <a:pPr>
@@ -3625,25 +4081,94 @@
               </a:defRPr>
             </a:pPr>
             <a:r>
-              <a:t>• Service complaints are concentrated at repeat addresses.</a:t>
-            </a:r>
-            <a:br/>
-            <a:r>
-              <a:t>• Residents, not just finances, are at the heart of the issue.</a:t>
-            </a:r>
-            <a:br/>
-            <a:r>
-              <a:t>• Alternative fine structures vary in financial impact.</a:t>
-            </a:r>
-            <a:br/>
-            <a:r>
-              <a:t>• Long-term success depends on improving reliability, not penalties alone.</a:t>
-            </a:r>
-            <a:br/>
-            <a:br/>
-            <a:r>
-              <a:t>[Insert: Icons or checkmarks]</a:t>
-            </a:r>
+              <a:rPr lang="en-US" dirty="0"/>
+              <a:t>Future analysis on s</a:t>
+            </a:r>
+            <a:r>
+              <a:rPr dirty="0"/>
+              <a:t>ix-month rolling window methods</a:t>
+            </a:r>
+            <a:r>
+              <a:rPr lang="en-US" dirty="0"/>
+              <a:t> would include:</a:t>
+            </a:r>
+          </a:p>
+          <a:p>
+            <a:pPr marL="342900" indent="-342900">
+              <a:buFont typeface="Arial" panose="020B0604020202020204" pitchFamily="34" charset="0"/>
+              <a:buChar char="•"/>
+              <a:defRPr sz="2200">
+                <a:solidFill>
+                  <a:srgbClr val="282828"/>
+                </a:solidFill>
+                <a:latin typeface="Segoe UI"/>
+              </a:defRPr>
+            </a:pPr>
+            <a:r>
+              <a:rPr lang="en-US" dirty="0"/>
+              <a:t>[Carolyn to describe what we would do if we had more time to answer the bonus questions]</a:t>
+            </a:r>
+          </a:p>
+          <a:p>
+            <a:pPr marL="800100" lvl="1" indent="-342900">
+              <a:buFont typeface="Arial" panose="020B0604020202020204" pitchFamily="34" charset="0"/>
+              <a:buChar char="•"/>
+              <a:defRPr sz="2200">
+                <a:solidFill>
+                  <a:srgbClr val="282828"/>
+                </a:solidFill>
+                <a:latin typeface="Segoe UI"/>
+              </a:defRPr>
+            </a:pPr>
+            <a:r>
+              <a:rPr lang="en-US" dirty="0"/>
+              <a:t>What steps would we take?</a:t>
+            </a:r>
+          </a:p>
+          <a:p>
+            <a:pPr marL="1257300" lvl="2" indent="-342900">
+              <a:buFont typeface="Arial" panose="020B0604020202020204" pitchFamily="34" charset="0"/>
+              <a:buChar char="•"/>
+              <a:defRPr sz="2200">
+                <a:solidFill>
+                  <a:srgbClr val="282828"/>
+                </a:solidFill>
+                <a:latin typeface="Segoe UI"/>
+              </a:defRPr>
+            </a:pPr>
+            <a:r>
+              <a:rPr lang="en-US" dirty="0"/>
+              <a:t>Dashboard concept with data-driven monitoring + performance dashboards could reduce repeat incidents.</a:t>
+            </a:r>
+          </a:p>
+          <a:p>
+            <a:pPr marL="1257300" lvl="2" indent="-342900">
+              <a:buFont typeface="Arial" panose="020B0604020202020204" pitchFamily="34" charset="0"/>
+              <a:buChar char="•"/>
+              <a:defRPr sz="2200">
+                <a:solidFill>
+                  <a:srgbClr val="282828"/>
+                </a:solidFill>
+                <a:latin typeface="Segoe UI"/>
+              </a:defRPr>
+            </a:pPr>
+            <a:r>
+              <a:rPr lang="en-US" dirty="0"/>
+              <a:t>…</a:t>
+            </a:r>
+            <a:br>
+              <a:rPr lang="en-US" dirty="0"/>
+            </a:br>
+            <a:br>
+              <a:rPr lang="en-US" dirty="0"/>
+            </a:br>
+            <a:br>
+              <a:rPr dirty="0"/>
+            </a:br>
+            <a:br>
+              <a:rPr dirty="0"/>
+            </a:br>
+            <a:endParaRPr dirty="0"/>
           </a:p>
         </p:txBody>
       </p:sp>
@@ -3655,7 +4180,7 @@
 </p:sld>
 </file>
 
-<file path=ppt/slides/slide2.xml><?xml version="1.0" encoding="utf-8"?>
+<file path=ppt/slides/slide14.xml><?xml version="1.0" encoding="utf-8"?>
 <p:sld xmlns:a="http://schemas.openxmlformats.org/drawingml/2006/main" xmlns:r="http://schemas.openxmlformats.org/officeDocument/2006/relationships" xmlns:p="http://schemas.openxmlformats.org/presentationml/2006/main">
   <p:cSld>
     <p:spTree>
@@ -3680,8 +4205,8 @@
         </p:nvSpPr>
         <p:spPr>
           <a:xfrm>
-            <a:off x="0" y="2743200"/>
-            <a:ext cx="12188952" cy="1371600"/>
+            <a:off x="457201" y="11151"/>
+            <a:ext cx="11274552" cy="1354217"/>
           </a:xfrm>
           <a:prstGeom prst="rect">
             <a:avLst/>
@@ -3689,30 +4214,563 @@
           <a:noFill/>
         </p:spPr>
         <p:txBody>
-          <a:bodyPr wrap="none">
+          <a:bodyPr wrap="square">
             <a:spAutoFit/>
           </a:bodyPr>
           <a:lstStyle/>
           <a:p>
+            <a:endParaRPr dirty="0"/>
+          </a:p>
+          <a:p>
+            <a:pPr>
+              <a:defRPr sz="3200" b="1">
+                <a:solidFill>
+                  <a:srgbClr val="003366"/>
+                </a:solidFill>
+                <a:latin typeface="Segoe UI"/>
+              </a:defRPr>
+            </a:pPr>
+            <a:r>
+              <a:rPr dirty="0"/>
+              <a:t>Key takeaways </a:t>
+            </a:r>
+            <a:r>
+              <a:rPr lang="en-US" dirty="0"/>
+              <a:t>and next steps </a:t>
+            </a:r>
+            <a:r>
+              <a:rPr dirty="0"/>
+              <a:t>for Nashville officials and stakeholders</a:t>
+            </a:r>
+          </a:p>
+        </p:txBody>
+      </p:sp>
+      <p:sp>
+        <p:nvSpPr>
+          <p:cNvPr id="3" name="TextBox 2"/>
+          <p:cNvSpPr txBox="1"/>
+          <p:nvPr/>
+        </p:nvSpPr>
+        <p:spPr>
+          <a:xfrm>
+            <a:off x="457072" y="1365368"/>
+            <a:ext cx="11274552" cy="3016210"/>
+          </a:xfrm>
+          <a:prstGeom prst="rect">
+            <a:avLst/>
+          </a:prstGeom>
+          <a:noFill/>
+        </p:spPr>
+        <p:txBody>
+          <a:bodyPr wrap="square">
+            <a:spAutoFit/>
+          </a:bodyPr>
+          <a:lstStyle/>
+          <a:p>
+            <a:r>
+              <a:rPr lang="en-US" dirty="0"/>
+              <a:t>[Carolyn to add takeaways given the data. I’m not sure what we’ll find, but it will be something today!!! ]</a:t>
+            </a:r>
+          </a:p>
+          <a:p>
+            <a:pPr lvl="2"/>
+            <a:endParaRPr dirty="0"/>
+          </a:p>
+          <a:p>
+            <a:pPr lvl="2">
+              <a:defRPr sz="2200">
+                <a:solidFill>
+                  <a:srgbClr val="282828"/>
+                </a:solidFill>
+                <a:latin typeface="Segoe UI"/>
+              </a:defRPr>
+            </a:pPr>
+            <a:r>
+              <a:rPr dirty="0"/>
+              <a:t>• Residents, not just finances, are at the heart of the issue.</a:t>
+            </a:r>
+            <a:br>
+              <a:rPr dirty="0"/>
+            </a:br>
+            <a:r>
+              <a:rPr dirty="0"/>
+              <a:t>• Alternative fine structures </a:t>
+            </a:r>
+            <a:r>
+              <a:rPr lang="en-US" dirty="0"/>
+              <a:t>could </a:t>
+            </a:r>
+            <a:r>
+              <a:rPr dirty="0"/>
+              <a:t>vary in financial impact.</a:t>
+            </a:r>
+            <a:br>
+              <a:rPr dirty="0"/>
+            </a:br>
+            <a:r>
+              <a:rPr dirty="0"/>
+              <a:t>• Long-term success depends on improving reliability, not penalties alone.</a:t>
+            </a:r>
+            <a:endParaRPr lang="en-US" dirty="0"/>
+          </a:p>
+          <a:p>
+            <a:pPr lvl="2">
+              <a:defRPr sz="2200">
+                <a:solidFill>
+                  <a:srgbClr val="282828"/>
+                </a:solidFill>
+                <a:latin typeface="Segoe UI"/>
+              </a:defRPr>
+            </a:pPr>
+            <a:endParaRPr lang="en-US" dirty="0"/>
+          </a:p>
+          <a:p>
+            <a:pPr lvl="2">
+              <a:defRPr sz="2200">
+                <a:solidFill>
+                  <a:srgbClr val="282828"/>
+                </a:solidFill>
+                <a:latin typeface="Segoe UI"/>
+              </a:defRPr>
+            </a:pPr>
+            <a:endParaRPr lang="en-US" dirty="0"/>
+          </a:p>
+          <a:p>
+            <a:pPr>
+              <a:defRPr sz="2200">
+                <a:solidFill>
+                  <a:srgbClr val="282828"/>
+                </a:solidFill>
+                <a:latin typeface="Segoe UI"/>
+              </a:defRPr>
+            </a:pPr>
+            <a:r>
+              <a:rPr lang="en-US" dirty="0"/>
+              <a:t>[Carolyn to add next steps]</a:t>
+            </a:r>
+          </a:p>
+          <a:p>
+            <a:pPr lvl="2">
+              <a:defRPr sz="2200">
+                <a:solidFill>
+                  <a:srgbClr val="282828"/>
+                </a:solidFill>
+                <a:latin typeface="Segoe UI"/>
+              </a:defRPr>
+            </a:pPr>
+            <a:endParaRPr dirty="0"/>
+          </a:p>
+        </p:txBody>
+      </p:sp>
+    </p:spTree>
+  </p:cSld>
+  <p:clrMapOvr>
+    <a:masterClrMapping/>
+  </p:clrMapOvr>
+</p:sld>
+</file>
+
+<file path=ppt/slides/slide2.xml><?xml version="1.0" encoding="utf-8"?>
+<p:sld xmlns:a="http://schemas.openxmlformats.org/drawingml/2006/main" xmlns:r="http://schemas.openxmlformats.org/officeDocument/2006/relationships" xmlns:p="http://schemas.openxmlformats.org/presentationml/2006/main">
+  <p:cSld>
+    <p:spTree>
+      <p:nvGrpSpPr>
+        <p:cNvPr id="1" name="">
+          <a:extLst>
+            <a:ext uri="{FF2B5EF4-FFF2-40B4-BE49-F238E27FC236}">
+              <a16:creationId xmlns:a16="http://schemas.microsoft.com/office/drawing/2014/main" id="{B26AA007-8704-DF66-81E0-8B297EBBACBE}"/>
+            </a:ext>
+          </a:extLst>
+        </p:cNvPr>
+        <p:cNvGrpSpPr/>
+        <p:nvPr/>
+      </p:nvGrpSpPr>
+      <p:grpSpPr>
+        <a:xfrm>
+          <a:off x="0" y="0"/>
+          <a:ext cx="0" cy="0"/>
+          <a:chOff x="0" y="0"/>
+          <a:chExt cx="0" cy="0"/>
+        </a:xfrm>
+      </p:grpSpPr>
+      <p:sp>
+        <p:nvSpPr>
+          <p:cNvPr id="2" name="Title 1">
+            <a:extLst>
+              <a:ext uri="{FF2B5EF4-FFF2-40B4-BE49-F238E27FC236}">
+                <a16:creationId xmlns:a16="http://schemas.microsoft.com/office/drawing/2014/main" id="{C5FE5DEF-83A5-C26B-18E9-4E810F6F5CEC}"/>
+              </a:ext>
+            </a:extLst>
+          </p:cNvPr>
+          <p:cNvSpPr>
+            <a:spLocks noGrp="1"/>
+          </p:cNvSpPr>
+          <p:nvPr>
+            <p:ph type="ctrTitle"/>
+          </p:nvPr>
+        </p:nvSpPr>
+        <p:spPr>
+          <a:xfrm>
+            <a:off x="2208212" y="484187"/>
+            <a:ext cx="7772400" cy="1470025"/>
+          </a:xfrm>
+        </p:spPr>
+        <p:txBody>
+          <a:bodyPr/>
+          <a:lstStyle/>
+          <a:p>
+            <a:r>
+              <a:rPr lang="en-US" sz="3600" dirty="0">
+                <a:solidFill>
+                  <a:srgbClr val="003366"/>
+                </a:solidFill>
+                <a:latin typeface="Segoe UI"/>
+              </a:rPr>
+              <a:t>Tasks Wednesday 9/24/25</a:t>
+            </a:r>
+            <a:endParaRPr sz="3600" dirty="0">
+              <a:solidFill>
+                <a:srgbClr val="003366"/>
+              </a:solidFill>
+              <a:latin typeface="Segoe UI"/>
+            </a:endParaRPr>
+          </a:p>
+        </p:txBody>
+      </p:sp>
+      <p:sp>
+        <p:nvSpPr>
+          <p:cNvPr id="3" name="Subtitle 2">
+            <a:extLst>
+              <a:ext uri="{FF2B5EF4-FFF2-40B4-BE49-F238E27FC236}">
+                <a16:creationId xmlns:a16="http://schemas.microsoft.com/office/drawing/2014/main" id="{AF8F5643-95D2-9C85-5EA6-07C6D2800BC8}"/>
+              </a:ext>
+            </a:extLst>
+          </p:cNvPr>
+          <p:cNvSpPr>
+            <a:spLocks noGrp="1"/>
+          </p:cNvSpPr>
+          <p:nvPr>
+            <p:ph type="subTitle" idx="1"/>
+          </p:nvPr>
+        </p:nvSpPr>
+        <p:spPr>
+          <a:xfrm>
+            <a:off x="963561" y="1641987"/>
+            <a:ext cx="10638504" cy="4522839"/>
+          </a:xfrm>
+        </p:spPr>
+        <p:txBody>
+          <a:bodyPr>
+            <a:normAutofit fontScale="77500" lnSpcReduction="20000"/>
+          </a:bodyPr>
+          <a:lstStyle/>
+          <a:p>
             <a:pPr algn="l"/>
-            <a:endParaRPr/>
-          </a:p>
-          <a:p>
-            <a:pPr>
-              <a:defRPr sz="6000" b="1">
+            <a:r>
+              <a:rPr lang="en-US" sz="2200" dirty="0">
                 <a:solidFill>
                   <a:srgbClr val="003366"/>
                 </a:solidFill>
                 <a:latin typeface="Segoe UI"/>
-              </a:defRPr>
-            </a:pPr>
-            <a:r>
-              <a:t>SITUATION</a:t>
-            </a:r>
+              </a:rPr>
+              <a:t>Mike: </a:t>
+            </a:r>
+          </a:p>
+          <a:p>
+            <a:pPr marL="457200" indent="-457200" algn="l">
+              <a:buAutoNum type="arabicPeriod"/>
+            </a:pPr>
+            <a:r>
+              <a:rPr lang="en-US" sz="2200" dirty="0">
+                <a:solidFill>
+                  <a:srgbClr val="003366"/>
+                </a:solidFill>
+                <a:latin typeface="Segoe UI"/>
+              </a:rPr>
+              <a:t>Create map code and push </a:t>
+            </a:r>
+          </a:p>
+          <a:p>
+            <a:pPr marL="457200" indent="-457200" algn="l">
+              <a:buAutoNum type="arabicPeriod"/>
+            </a:pPr>
+            <a:r>
+              <a:rPr lang="en-US" sz="2200" dirty="0">
+                <a:solidFill>
+                  <a:srgbClr val="003366"/>
+                </a:solidFill>
+                <a:latin typeface="Segoe UI"/>
+              </a:rPr>
+              <a:t>Create overview chart by type in situation</a:t>
+            </a:r>
+          </a:p>
+          <a:p>
+            <a:pPr marL="457200" indent="-457200" algn="l">
+              <a:buAutoNum type="arabicPeriod"/>
+            </a:pPr>
+            <a:r>
+              <a:rPr lang="en-US" sz="2200" dirty="0">
+                <a:solidFill>
+                  <a:srgbClr val="003366"/>
+                </a:solidFill>
+                <a:latin typeface="Segoe UI"/>
+              </a:rPr>
+              <a:t>Attempt heat map for all vendors using merged CSV</a:t>
+            </a:r>
+          </a:p>
+          <a:p>
+            <a:pPr marL="457200" indent="-457200" algn="l">
+              <a:buAutoNum type="arabicPeriod"/>
+            </a:pPr>
+            <a:endParaRPr lang="en-US" sz="2200" dirty="0">
+              <a:solidFill>
+                <a:srgbClr val="003366"/>
+              </a:solidFill>
+              <a:latin typeface="Segoe UI"/>
+            </a:endParaRPr>
+          </a:p>
+          <a:p>
+            <a:pPr algn="l"/>
+            <a:r>
+              <a:rPr lang="en-US" sz="2200" dirty="0">
+                <a:solidFill>
+                  <a:srgbClr val="003366"/>
+                </a:solidFill>
+                <a:latin typeface="Segoe UI"/>
+              </a:rPr>
+              <a:t>Carolyn: </a:t>
+            </a:r>
+          </a:p>
+          <a:p>
+            <a:pPr algn="l"/>
+            <a:r>
+              <a:rPr lang="en-US" sz="2200" dirty="0">
+                <a:solidFill>
+                  <a:srgbClr val="003366"/>
+                </a:solidFill>
+                <a:latin typeface="Segoe UI"/>
+              </a:rPr>
+              <a:t>1. Make this PPT and storyline sing </a:t>
+            </a:r>
+            <a:r>
+              <a:rPr lang="en-US" sz="2200" dirty="0">
+                <a:solidFill>
+                  <a:srgbClr val="003366"/>
+                </a:solidFill>
+                <a:latin typeface="Segoe UI"/>
+                <a:sym typeface="Wingdings" panose="05000000000000000000" pitchFamily="2" charset="2"/>
+              </a:rPr>
+              <a:t></a:t>
+            </a:r>
+            <a:endParaRPr lang="en-US" sz="2200" dirty="0">
+              <a:solidFill>
+                <a:srgbClr val="003366"/>
+              </a:solidFill>
+              <a:latin typeface="Segoe UI"/>
+            </a:endParaRPr>
+          </a:p>
+          <a:p>
+            <a:pPr algn="l"/>
+            <a:endParaRPr lang="en-US" sz="2200" dirty="0">
+              <a:solidFill>
+                <a:srgbClr val="003366"/>
+              </a:solidFill>
+              <a:latin typeface="Segoe UI"/>
+            </a:endParaRPr>
+          </a:p>
+          <a:p>
+            <a:pPr algn="l"/>
+            <a:r>
+              <a:rPr lang="en-US" sz="2200" dirty="0">
+                <a:solidFill>
+                  <a:srgbClr val="003366"/>
+                </a:solidFill>
+                <a:latin typeface="Segoe UI"/>
+              </a:rPr>
+              <a:t>Chris:</a:t>
+            </a:r>
+          </a:p>
+          <a:p>
+            <a:pPr marL="457200" indent="-457200" algn="l">
+              <a:buFont typeface="Arial"/>
+              <a:buAutoNum type="arabicPeriod"/>
+            </a:pPr>
+            <a:r>
+              <a:rPr lang="en-US" sz="2200" dirty="0">
+                <a:solidFill>
+                  <a:srgbClr val="003366"/>
+                </a:solidFill>
+                <a:latin typeface="Segoe UI"/>
+              </a:rPr>
+              <a:t>Investigate merge in python: </a:t>
+            </a:r>
+            <a:r>
+              <a:rPr lang="en-US" sz="2200" dirty="0" err="1">
+                <a:solidFill>
+                  <a:srgbClr val="003366"/>
+                </a:solidFill>
+                <a:latin typeface="Segoe UI"/>
+              </a:rPr>
+              <a:t>wmissed</a:t>
+            </a:r>
+            <a:r>
+              <a:rPr lang="en-US" sz="2200" dirty="0">
+                <a:solidFill>
+                  <a:srgbClr val="003366"/>
+                </a:solidFill>
+                <a:latin typeface="Segoe UI"/>
+              </a:rPr>
+              <a:t>, and missed with </a:t>
+            </a:r>
+            <a:r>
+              <a:rPr lang="en-US" sz="2200" dirty="0" err="1">
+                <a:solidFill>
+                  <a:srgbClr val="003366"/>
+                </a:solidFill>
+                <a:latin typeface="Segoe UI"/>
+              </a:rPr>
+              <a:t>rrmissed</a:t>
+            </a:r>
+            <a:r>
+              <a:rPr lang="en-US" sz="2200" dirty="0">
+                <a:solidFill>
+                  <a:srgbClr val="003366"/>
+                </a:solidFill>
+                <a:latin typeface="Segoe UI"/>
+              </a:rPr>
+              <a:t> and original CSV and send to slack</a:t>
+            </a:r>
+          </a:p>
+          <a:p>
+            <a:pPr marL="457200" indent="-457200" algn="l">
+              <a:buAutoNum type="arabicPeriod"/>
+            </a:pPr>
+            <a:r>
+              <a:rPr lang="en-US" sz="2200" dirty="0">
+                <a:solidFill>
+                  <a:srgbClr val="003366"/>
+                </a:solidFill>
+                <a:latin typeface="Segoe UI"/>
+              </a:rPr>
+              <a:t>Answer these questions in the complication section</a:t>
+            </a:r>
+          </a:p>
+          <a:p>
+            <a:pPr marL="914400" lvl="1" indent="-457200" algn="l">
+              <a:buAutoNum type="arabicPeriod"/>
+            </a:pPr>
+            <a:endParaRPr lang="en-US" sz="1800" dirty="0">
+              <a:solidFill>
+                <a:srgbClr val="003366"/>
+              </a:solidFill>
+              <a:latin typeface="Segoe UI"/>
+            </a:endParaRPr>
+          </a:p>
+          <a:p>
+            <a:pPr marL="914400" lvl="1" indent="-457200" algn="l">
+              <a:buAutoNum type="arabicPeriod"/>
+            </a:pPr>
+            <a:r>
+              <a:rPr lang="en-US" sz="1800" dirty="0">
+                <a:solidFill>
+                  <a:srgbClr val="003366"/>
+                </a:solidFill>
+                <a:latin typeface="Segoe UI"/>
+              </a:rPr>
+              <a:t>How do metro crews compare to the contractor's performance?</a:t>
+            </a:r>
+          </a:p>
+          <a:p>
+            <a:pPr marL="914400" lvl="1" indent="-457200" algn="l">
+              <a:buAutoNum type="arabicPeriod"/>
+            </a:pPr>
+            <a:endParaRPr lang="en-US" sz="1800" dirty="0">
+              <a:solidFill>
+                <a:srgbClr val="003366"/>
+              </a:solidFill>
+              <a:latin typeface="Segoe UI"/>
+            </a:endParaRPr>
+          </a:p>
+          <a:p>
+            <a:pPr marL="914400" lvl="1" indent="-457200" algn="l">
+              <a:buAutoNum type="arabicPeriod"/>
+            </a:pPr>
+            <a:r>
+              <a:rPr lang="en-US" sz="1800" dirty="0">
+                <a:solidFill>
+                  <a:srgbClr val="003366"/>
+                </a:solidFill>
+                <a:latin typeface="Segoe UI"/>
+              </a:rPr>
+              <a:t>How much does each trash hauler owe?</a:t>
+            </a:r>
+          </a:p>
+          <a:p>
+            <a:pPr marL="914400" lvl="1" indent="-457200" algn="l">
+              <a:buAutoNum type="arabicPeriod"/>
+            </a:pPr>
+            <a:endParaRPr lang="en-US" sz="1800" dirty="0">
+              <a:solidFill>
+                <a:srgbClr val="003366"/>
+              </a:solidFill>
+              <a:latin typeface="Segoe UI"/>
+            </a:endParaRPr>
+          </a:p>
+          <a:p>
+            <a:pPr marL="914400" lvl="1" indent="-457200" algn="l">
+              <a:buAutoNum type="arabicPeriod"/>
+            </a:pPr>
+            <a:r>
+              <a:rPr lang="en-US" sz="1800" dirty="0">
+                <a:solidFill>
+                  <a:srgbClr val="003366"/>
+                </a:solidFill>
+                <a:latin typeface="Segoe UI"/>
+              </a:rPr>
+              <a:t>What were to total missed pickup by route?</a:t>
+            </a:r>
+          </a:p>
+          <a:p>
+            <a:pPr marL="914400" lvl="1" indent="-457200" algn="l">
+              <a:buAutoNum type="arabicPeriod"/>
+            </a:pPr>
+            <a:endParaRPr lang="en-US" sz="1800" dirty="0">
+              <a:solidFill>
+                <a:srgbClr val="003366"/>
+              </a:solidFill>
+              <a:latin typeface="Segoe UI"/>
+            </a:endParaRPr>
+          </a:p>
+          <a:p>
+            <a:pPr marL="457200" indent="-457200" algn="l">
+              <a:buAutoNum type="arabicPeriod"/>
+            </a:pPr>
+            <a:endParaRPr lang="en-US" sz="2200" dirty="0">
+              <a:solidFill>
+                <a:srgbClr val="003366"/>
+              </a:solidFill>
+              <a:latin typeface="Segoe UI"/>
+            </a:endParaRPr>
+          </a:p>
+          <a:p>
+            <a:pPr marL="457200" indent="-457200">
+              <a:buAutoNum type="arabicPeriod"/>
+            </a:pPr>
+            <a:endParaRPr sz="2200" dirty="0">
+              <a:solidFill>
+                <a:srgbClr val="003366"/>
+              </a:solidFill>
+              <a:latin typeface="Segoe UI"/>
+            </a:endParaRPr>
           </a:p>
         </p:txBody>
       </p:sp>
     </p:spTree>
+    <p:extLst>
+      <p:ext uri="{BB962C8B-B14F-4D97-AF65-F5344CB8AC3E}">
+        <p14:creationId xmlns:p14="http://schemas.microsoft.com/office/powerpoint/2010/main" val="3577927028"/>
+      </p:ext>
+    </p:extLst>
   </p:cSld>
   <p:clrMapOvr>
     <a:masterClrMapping/>
@@ -3745,8 +4803,8 @@
         </p:nvSpPr>
         <p:spPr>
           <a:xfrm>
-            <a:off x="457200" y="457200"/>
-            <a:ext cx="11274552" cy="914400"/>
+            <a:off x="0" y="2743200"/>
+            <a:ext cx="12188952" cy="1371600"/>
           </a:xfrm>
           <a:prstGeom prst="rect">
             <a:avLst/>
@@ -3759,11 +4817,12 @@
           </a:bodyPr>
           <a:lstStyle/>
           <a:p>
+            <a:pPr algn="l"/>
             <a:endParaRPr/>
           </a:p>
           <a:p>
             <a:pPr>
-              <a:defRPr sz="3200" b="1">
+              <a:defRPr sz="6000" b="1">
                 <a:solidFill>
                   <a:srgbClr val="003366"/>
                 </a:solidFill>
@@ -3771,51 +4830,7 @@
               </a:defRPr>
             </a:pPr>
             <a:r>
-              <a:t>Nashville residents face recurring issues with trash pickup</a:t>
-            </a:r>
-          </a:p>
-        </p:txBody>
-      </p:sp>
-      <p:sp>
-        <p:nvSpPr>
-          <p:cNvPr id="3" name="TextBox 2"/>
-          <p:cNvSpPr txBox="1"/>
-          <p:nvPr/>
-        </p:nvSpPr>
-        <p:spPr>
-          <a:xfrm>
-            <a:off x="457200" y="1371600"/>
-            <a:ext cx="11274552" cy="5029200"/>
-          </a:xfrm>
-          <a:prstGeom prst="rect">
-            <a:avLst/>
-          </a:prstGeom>
-          <a:noFill/>
-        </p:spPr>
-        <p:txBody>
-          <a:bodyPr wrap="square">
-            <a:spAutoFit/>
-          </a:bodyPr>
-          <a:lstStyle/>
-          <a:p>
-            <a:endParaRPr/>
-          </a:p>
-          <a:p>
-            <a:pPr>
-              <a:defRPr sz="2200">
-                <a:solidFill>
-                  <a:srgbClr val="282828"/>
-                </a:solidFill>
-                <a:latin typeface="Segoe UI"/>
-              </a:defRPr>
-            </a:pPr>
-            <a:r>
-              <a:t>Two years of data (Nov 2017–Nov 2019) reveal widespread service complaints.</a:t>
-            </a:r>
-            <a:br/>
-            <a:br/>
-            <a:r>
-              <a:t>[Insert: Bar chart of service requests by type]</a:t>
+              <a:t>SITUATION</a:t>
             </a:r>
           </a:p>
         </p:txBody>
@@ -3853,7 +4868,7 @@
         </p:nvSpPr>
         <p:spPr>
           <a:xfrm>
-            <a:off x="457200" y="457200"/>
+            <a:off x="457136" y="0"/>
             <a:ext cx="11274552" cy="914400"/>
           </a:xfrm>
           <a:prstGeom prst="rect">
@@ -3867,7 +4882,7 @@
           </a:bodyPr>
           <a:lstStyle/>
           <a:p>
-            <a:endParaRPr/>
+            <a:endParaRPr dirty="0"/>
           </a:p>
           <a:p>
             <a:pPr>
@@ -3879,7 +4894,8 @@
               </a:defRPr>
             </a:pPr>
             <a:r>
-              <a:t>Missed pickups create repeat frustration for residents</a:t>
+              <a:rPr dirty="0"/>
+              <a:t>Nashville residents face recurring issues with trash pickup</a:t>
             </a:r>
           </a:p>
         </p:txBody>
@@ -3892,8 +4908,8 @@
         </p:nvSpPr>
         <p:spPr>
           <a:xfrm>
-            <a:off x="457200" y="1371600"/>
-            <a:ext cx="11274552" cy="5029200"/>
+            <a:off x="457136" y="914400"/>
+            <a:ext cx="11274552" cy="4801314"/>
           </a:xfrm>
           <a:prstGeom prst="rect">
             <a:avLst/>
@@ -3906,7 +4922,7 @@
           </a:bodyPr>
           <a:lstStyle/>
           <a:p>
-            <a:endParaRPr/>
+            <a:endParaRPr dirty="0"/>
           </a:p>
           <a:p>
             <a:pPr>
@@ -3918,13 +4934,128 @@
               </a:defRPr>
             </a:pPr>
             <a:r>
-              <a:t>One-time issues are inconvenient; repeated issues at the same address drive frustration.</a:t>
-            </a:r>
-            <a:br/>
-            <a:br/>
-            <a:r>
-              <a:t>[Insert: Histogram of addresses with 2+, 3+, 5+ missed pickups]</a:t>
-            </a:r>
+              <a:rPr dirty="0"/>
+              <a:t>Two years of data (Nov 2017–Nov 2019) reveal widespread service complaints.</a:t>
+            </a:r>
+            <a:br>
+              <a:rPr dirty="0"/>
+            </a:br>
+            <a:br>
+              <a:rPr dirty="0"/>
+            </a:br>
+            <a:r>
+              <a:rPr dirty="0"/>
+              <a:t>[</a:t>
+            </a:r>
+            <a:r>
+              <a:rPr lang="en-US" dirty="0"/>
+              <a:t>Carolyn to </a:t>
+            </a:r>
+            <a:r>
+              <a:rPr dirty="0"/>
+              <a:t>Insert</a:t>
+            </a:r>
+            <a:r>
+              <a:rPr lang="en-US" dirty="0"/>
+              <a:t> using Chris’ merged file </a:t>
+            </a:r>
+            <a:r>
+              <a:rPr lang="en-US" dirty="0" err="1"/>
+              <a:t>trash_hauler_EDA_merged</a:t>
+            </a:r>
+            <a:r>
+              <a:rPr dirty="0"/>
+              <a:t>: </a:t>
+            </a:r>
+            <a:endParaRPr lang="en-US" dirty="0"/>
+          </a:p>
+          <a:p>
+            <a:pPr>
+              <a:defRPr sz="2200">
+                <a:solidFill>
+                  <a:srgbClr val="282828"/>
+                </a:solidFill>
+                <a:latin typeface="Segoe UI"/>
+              </a:defRPr>
+            </a:pPr>
+            <a:r>
+              <a:rPr dirty="0"/>
+              <a:t>Bar chart of service requests by type</a:t>
+            </a:r>
+            <a:r>
+              <a:rPr lang="en-US" dirty="0"/>
+              <a:t> to answer question: </a:t>
+            </a:r>
+          </a:p>
+          <a:p>
+            <a:pPr>
+              <a:defRPr sz="2200">
+                <a:solidFill>
+                  <a:srgbClr val="282828"/>
+                </a:solidFill>
+                <a:latin typeface="Segoe UI"/>
+              </a:defRPr>
+            </a:pPr>
+            <a:r>
+              <a:rPr lang="en-US" dirty="0"/>
+              <a:t>What other types of complaints are there? This is an overview of all vendors and report types.]</a:t>
+            </a:r>
+          </a:p>
+          <a:p>
+            <a:endParaRPr lang="en-US" dirty="0"/>
+          </a:p>
+          <a:p>
+            <a:r>
+              <a:rPr lang="en-US" dirty="0"/>
+              <a:t>Red River, Waste Ind, Metro vendors</a:t>
+            </a:r>
+          </a:p>
+          <a:p>
+            <a:r>
+              <a:rPr lang="en-US" b="1" dirty="0"/>
+              <a:t>Missed Pickups, </a:t>
+            </a:r>
+            <a:r>
+              <a:rPr lang="en-US" dirty="0"/>
+              <a:t>Damage to Property, Other? Whatever the other categories are that add up to the total amount of reported ~22K</a:t>
+            </a:r>
+            <a:br>
+              <a:rPr lang="en-US" dirty="0"/>
+            </a:br>
+            <a:endParaRPr lang="en-US" dirty="0"/>
+          </a:p>
+          <a:p>
+            <a:pPr>
+              <a:defRPr sz="2200">
+                <a:solidFill>
+                  <a:srgbClr val="282828"/>
+                </a:solidFill>
+                <a:latin typeface="Segoe UI"/>
+              </a:defRPr>
+            </a:pPr>
+            <a:endParaRPr lang="en-US" dirty="0"/>
+          </a:p>
+          <a:p>
+            <a:pPr>
+              <a:defRPr sz="2200">
+                <a:solidFill>
+                  <a:srgbClr val="282828"/>
+                </a:solidFill>
+                <a:latin typeface="Segoe UI"/>
+              </a:defRPr>
+            </a:pPr>
+            <a:endParaRPr lang="en-US" dirty="0"/>
+          </a:p>
+          <a:p>
+            <a:pPr>
+              <a:defRPr sz="2200">
+                <a:solidFill>
+                  <a:srgbClr val="282828"/>
+                </a:solidFill>
+                <a:latin typeface="Segoe UI"/>
+              </a:defRPr>
+            </a:pPr>
+            <a:endParaRPr dirty="0"/>
           </a:p>
         </p:txBody>
       </p:sp>
@@ -3961,8 +5092,8 @@
         </p:nvSpPr>
         <p:spPr>
           <a:xfrm>
-            <a:off x="0" y="2743200"/>
-            <a:ext cx="12188952" cy="1371600"/>
+            <a:off x="457136" y="55756"/>
+            <a:ext cx="11274552" cy="914400"/>
           </a:xfrm>
           <a:prstGeom prst="rect">
             <a:avLst/>
@@ -3975,12 +5106,11 @@
           </a:bodyPr>
           <a:lstStyle/>
           <a:p>
-            <a:pPr algn="l"/>
-            <a:endParaRPr/>
+            <a:endParaRPr dirty="0"/>
           </a:p>
           <a:p>
             <a:pPr>
-              <a:defRPr sz="6000" b="1">
+              <a:defRPr sz="3200" b="1">
                 <a:solidFill>
                   <a:srgbClr val="003366"/>
                 </a:solidFill>
@@ -3988,8 +5118,81 @@
               </a:defRPr>
             </a:pPr>
             <a:r>
-              <a:t>COMPLICATION</a:t>
-            </a:r>
+              <a:rPr dirty="0"/>
+              <a:t>Missed pickups create repeat frustration for residents</a:t>
+            </a:r>
+          </a:p>
+        </p:txBody>
+      </p:sp>
+      <p:sp>
+        <p:nvSpPr>
+          <p:cNvPr id="3" name="TextBox 2"/>
+          <p:cNvSpPr txBox="1"/>
+          <p:nvPr/>
+        </p:nvSpPr>
+        <p:spPr>
+          <a:xfrm>
+            <a:off x="457136" y="914400"/>
+            <a:ext cx="11274552" cy="1723549"/>
+          </a:xfrm>
+          <a:prstGeom prst="rect">
+            <a:avLst/>
+          </a:prstGeom>
+          <a:noFill/>
+        </p:spPr>
+        <p:txBody>
+          <a:bodyPr wrap="square">
+            <a:spAutoFit/>
+          </a:bodyPr>
+          <a:lstStyle/>
+          <a:p>
+            <a:endParaRPr dirty="0"/>
+          </a:p>
+          <a:p>
+            <a:pPr>
+              <a:defRPr sz="2200">
+                <a:solidFill>
+                  <a:srgbClr val="282828"/>
+                </a:solidFill>
+                <a:latin typeface="Segoe UI"/>
+              </a:defRPr>
+            </a:pPr>
+            <a:r>
+              <a:rPr dirty="0"/>
+              <a:t>One-time issues are inconvenient; repeated issues at the same address drive frustration.</a:t>
+            </a:r>
+            <a:br>
+              <a:rPr dirty="0"/>
+            </a:br>
+            <a:br>
+              <a:rPr dirty="0"/>
+            </a:br>
+            <a:r>
+              <a:t>[</a:t>
+            </a:r>
+            <a:r>
+              <a:rPr lang="en-US"/>
+              <a:t>Mike </a:t>
+            </a:r>
+            <a:r>
+              <a:rPr lang="en-US" dirty="0"/>
+              <a:t>to Insert Heat Map with all vendors to answer this question:</a:t>
+            </a:r>
+          </a:p>
+          <a:p>
+            <a:pPr>
+              <a:defRPr sz="2200">
+                <a:solidFill>
+                  <a:srgbClr val="282828"/>
+                </a:solidFill>
+                <a:latin typeface="Segoe UI"/>
+              </a:defRPr>
+            </a:pPr>
+            <a:r>
+              <a:rPr lang="en-US" sz="2200" dirty="0"/>
+              <a:t>Make a heat map that shows the most total missed pick ups by zip code]</a:t>
+            </a:r>
+            <a:endParaRPr dirty="0"/>
           </a:p>
         </p:txBody>
       </p:sp>
@@ -4026,7 +5229,7 @@
         </p:nvSpPr>
         <p:spPr>
           <a:xfrm>
-            <a:off x="457200" y="457200"/>
+            <a:off x="457136" y="-89210"/>
             <a:ext cx="11274552" cy="914400"/>
           </a:xfrm>
           <a:prstGeom prst="rect">
@@ -4040,7 +5243,7 @@
           </a:bodyPr>
           <a:lstStyle/>
           <a:p>
-            <a:endParaRPr/>
+            <a:endParaRPr dirty="0"/>
           </a:p>
           <a:p>
             <a:pPr>
@@ -4052,6 +5255,7 @@
               </a:defRPr>
             </a:pPr>
             <a:r>
+              <a:rPr dirty="0"/>
               <a:t>Chronic service failures undermine trust in contractors</a:t>
             </a:r>
           </a:p>
@@ -4065,8 +5269,8 @@
         </p:nvSpPr>
         <p:spPr>
           <a:xfrm>
-            <a:off x="457200" y="1371600"/>
-            <a:ext cx="11274552" cy="5029200"/>
+            <a:off x="457200" y="825190"/>
+            <a:ext cx="11274552" cy="2062103"/>
           </a:xfrm>
           <a:prstGeom prst="rect">
             <a:avLst/>
@@ -4079,7 +5283,7 @@
           </a:bodyPr>
           <a:lstStyle/>
           <a:p>
-            <a:endParaRPr/>
+            <a:endParaRPr dirty="0"/>
           </a:p>
           <a:p>
             <a:pPr>
@@ -4091,13 +5295,20 @@
               </a:defRPr>
             </a:pPr>
             <a:r>
+              <a:rPr dirty="0"/>
               <a:t>Residents expect reliability. Chronic missed pickups fuel dissatisfaction and highlight performance gaps.</a:t>
             </a:r>
-            <a:br/>
-            <a:br/>
-            <a:r>
-              <a:t>[Insert: Heat map of missed pickups by zip code]</a:t>
-            </a:r>
+            <a:br>
+              <a:rPr dirty="0"/>
+            </a:br>
+            <a:br>
+              <a:rPr dirty="0"/>
+            </a:br>
+            <a:r>
+              <a:rPr lang="en-US" dirty="0"/>
+              <a:t>[Carolyn to add any story we want to tell to set this up. Maybe research Red River or Nashville Trash to conclude Situation and lead into Complication.]</a:t>
+            </a:r>
+            <a:endParaRPr dirty="0"/>
           </a:p>
         </p:txBody>
       </p:sp>
@@ -4134,8 +5345,8 @@
         </p:nvSpPr>
         <p:spPr>
           <a:xfrm>
-            <a:off x="457200" y="457200"/>
-            <a:ext cx="11274552" cy="914400"/>
+            <a:off x="0" y="2743200"/>
+            <a:ext cx="7021474" cy="1908215"/>
           </a:xfrm>
           <a:prstGeom prst="rect">
             <a:avLst/>
@@ -4148,11 +5359,12 @@
           </a:bodyPr>
           <a:lstStyle/>
           <a:p>
-            <a:endParaRPr/>
+            <a:pPr algn="l"/>
+            <a:endParaRPr dirty="0"/>
           </a:p>
           <a:p>
             <a:pPr>
-              <a:defRPr sz="3200" b="1">
+              <a:defRPr sz="6000" b="1">
                 <a:solidFill>
                   <a:srgbClr val="003366"/>
                 </a:solidFill>
@@ -4160,52 +5372,25 @@
               </a:defRPr>
             </a:pPr>
             <a:r>
-              <a:t>Financial penalties are triggered but frustration remains</a:t>
-            </a:r>
-          </a:p>
-        </p:txBody>
-      </p:sp>
-      <p:sp>
-        <p:nvSpPr>
-          <p:cNvPr id="3" name="TextBox 2"/>
-          <p:cNvSpPr txBox="1"/>
-          <p:nvPr/>
-        </p:nvSpPr>
-        <p:spPr>
-          <a:xfrm>
-            <a:off x="457200" y="1371600"/>
-            <a:ext cx="11274552" cy="5029200"/>
-          </a:xfrm>
-          <a:prstGeom prst="rect">
-            <a:avLst/>
-          </a:prstGeom>
-          <a:noFill/>
-        </p:spPr>
-        <p:txBody>
-          <a:bodyPr wrap="square">
-            <a:spAutoFit/>
-          </a:bodyPr>
-          <a:lstStyle/>
-          <a:p>
-            <a:endParaRPr/>
+              <a:rPr dirty="0"/>
+              <a:t>COMPLICATION</a:t>
+            </a:r>
+            <a:endParaRPr lang="en-US" dirty="0"/>
           </a:p>
           <a:p>
             <a:pPr>
-              <a:defRPr sz="2200">
-                <a:solidFill>
-                  <a:srgbClr val="282828"/>
-                </a:solidFill>
-                <a:latin typeface="Segoe UI"/>
-              </a:defRPr>
-            </a:pPr>
-            <a:r>
-              <a:t>Current system fines $200 for each repeat missed pickup, but penalties don’t address root causes.</a:t>
-            </a:r>
-            <a:br/>
-            <a:br/>
-            <a:r>
-              <a:t>[Insert: Table or chart of fines owed]</a:t>
-            </a:r>
+              <a:defRPr sz="6000" b="1">
+                <a:solidFill>
+                  <a:srgbClr val="003366"/>
+                </a:solidFill>
+                <a:latin typeface="Segoe UI"/>
+              </a:defRPr>
+            </a:pPr>
+            <a:r>
+              <a:rPr lang="en-US" sz="4000" dirty="0"/>
+              <a:t>RED RIVER MISSED PICKUPS</a:t>
+            </a:r>
+            <a:endParaRPr sz="4000" dirty="0"/>
           </a:p>
         </p:txBody>
       </p:sp>
@@ -4222,7 +5407,13 @@
   <p:cSld>
     <p:spTree>
       <p:nvGrpSpPr>
-        <p:cNvPr id="1" name=""/>
+        <p:cNvPr id="1" name="">
+          <a:extLst>
+            <a:ext uri="{FF2B5EF4-FFF2-40B4-BE49-F238E27FC236}">
+              <a16:creationId xmlns:a16="http://schemas.microsoft.com/office/drawing/2014/main" id="{6EF5340B-78F1-4A32-A0B6-1DF388043E94}"/>
+            </a:ext>
+          </a:extLst>
+        </p:cNvPr>
         <p:cNvGrpSpPr/>
         <p:nvPr/>
       </p:nvGrpSpPr>
@@ -4236,13 +5427,19 @@
       </p:grpSpPr>
       <p:sp>
         <p:nvSpPr>
-          <p:cNvPr id="2" name="TextBox 1"/>
+          <p:cNvPr id="2" name="TextBox 1">
+            <a:extLst>
+              <a:ext uri="{FF2B5EF4-FFF2-40B4-BE49-F238E27FC236}">
+                <a16:creationId xmlns:a16="http://schemas.microsoft.com/office/drawing/2014/main" id="{8997B03A-146C-FD61-97C9-0537CCD7FBB2}"/>
+              </a:ext>
+            </a:extLst>
+          </p:cNvPr>
           <p:cNvSpPr txBox="1"/>
           <p:nvPr/>
         </p:nvSpPr>
         <p:spPr>
           <a:xfrm>
-            <a:off x="457200" y="457200"/>
+            <a:off x="457200" y="0"/>
             <a:ext cx="11274552" cy="914400"/>
           </a:xfrm>
           <a:prstGeom prst="rect">
@@ -4256,7 +5453,7 @@
           </a:bodyPr>
           <a:lstStyle/>
           <a:p>
-            <a:endParaRPr/>
+            <a:endParaRPr dirty="0"/>
           </a:p>
           <a:p>
             <a:pPr>
@@ -4268,21 +5465,28 @@
               </a:defRPr>
             </a:pPr>
             <a:r>
-              <a:t>How do Metro crews compare to contractors?</a:t>
-            </a:r>
-          </a:p>
-        </p:txBody>
-      </p:sp>
-      <p:sp>
-        <p:nvSpPr>
-          <p:cNvPr id="3" name="TextBox 2"/>
+              <a:rPr dirty="0"/>
+              <a:t>Financial penalties are triggered but frustration remains</a:t>
+            </a:r>
+          </a:p>
+        </p:txBody>
+      </p:sp>
+      <p:sp>
+        <p:nvSpPr>
+          <p:cNvPr id="3" name="TextBox 2">
+            <a:extLst>
+              <a:ext uri="{FF2B5EF4-FFF2-40B4-BE49-F238E27FC236}">
+                <a16:creationId xmlns:a16="http://schemas.microsoft.com/office/drawing/2014/main" id="{032A6325-1901-923A-1748-E2B0D92EE9A6}"/>
+              </a:ext>
+            </a:extLst>
+          </p:cNvPr>
           <p:cNvSpPr txBox="1"/>
           <p:nvPr/>
         </p:nvSpPr>
         <p:spPr>
           <a:xfrm>
-            <a:off x="457200" y="1371600"/>
-            <a:ext cx="11274552" cy="5029200"/>
+            <a:off x="457136" y="914400"/>
+            <a:ext cx="11274552" cy="2739211"/>
           </a:xfrm>
           <a:prstGeom prst="rect">
             <a:avLst/>
@@ -4295,7 +5499,7 @@
           </a:bodyPr>
           <a:lstStyle/>
           <a:p>
-            <a:endParaRPr/>
+            <a:endParaRPr dirty="0"/>
           </a:p>
           <a:p>
             <a:pPr>
@@ -4307,17 +5511,55 @@
               </a:defRPr>
             </a:pPr>
             <a:r>
-              <a:t>Exploring whether Metro performs better than Red River and Waste Ind.</a:t>
-            </a:r>
-            <a:br/>
-            <a:br/>
-            <a:r>
-              <a:t>[Insert: Bar chart of missed pickups per hauler]</a:t>
-            </a:r>
+              <a:rPr dirty="0"/>
+              <a:t>Current system fines $200 for each repeat missed pickup, but penalties don’t address root causes.</a:t>
+            </a:r>
+            <a:br>
+              <a:rPr dirty="0"/>
+            </a:br>
+            <a:br>
+              <a:rPr dirty="0"/>
+            </a:br>
+            <a:r>
+              <a:rPr dirty="0"/>
+              <a:t>[</a:t>
+            </a:r>
+            <a:r>
+              <a:rPr lang="en-US" dirty="0"/>
+              <a:t>Carolyn to describe current penalty rules and how they are applied (use Chris’ rules he posted in slack, and reach out to him if needed)]</a:t>
+            </a:r>
+            <a:endParaRPr lang="en-US" sz="2200" dirty="0"/>
+          </a:p>
+          <a:p>
+            <a:pPr>
+              <a:defRPr sz="2200">
+                <a:solidFill>
+                  <a:srgbClr val="282828"/>
+                </a:solidFill>
+                <a:latin typeface="Segoe UI"/>
+              </a:defRPr>
+            </a:pPr>
+            <a:endParaRPr lang="en-US" sz="2200" dirty="0"/>
+          </a:p>
+          <a:p>
+            <a:pPr>
+              <a:defRPr sz="2200">
+                <a:solidFill>
+                  <a:srgbClr val="282828"/>
+                </a:solidFill>
+                <a:latin typeface="Segoe UI"/>
+              </a:defRPr>
+            </a:pPr>
+            <a:endParaRPr dirty="0"/>
           </a:p>
         </p:txBody>
       </p:sp>
     </p:spTree>
+    <p:extLst>
+      <p:ext uri="{BB962C8B-B14F-4D97-AF65-F5344CB8AC3E}">
+        <p14:creationId xmlns:p14="http://schemas.microsoft.com/office/powerpoint/2010/main" val="138084110"/>
+      </p:ext>
+    </p:extLst>
   </p:cSld>
   <p:clrMapOvr>
     <a:masterClrMapping/>
@@ -4350,8 +5592,8 @@
         </p:nvSpPr>
         <p:spPr>
           <a:xfrm>
-            <a:off x="0" y="2743200"/>
-            <a:ext cx="12188952" cy="1371600"/>
+            <a:off x="457200" y="0"/>
+            <a:ext cx="11274552" cy="914400"/>
           </a:xfrm>
           <a:prstGeom prst="rect">
             <a:avLst/>
@@ -4364,12 +5606,11 @@
           </a:bodyPr>
           <a:lstStyle/>
           <a:p>
-            <a:pPr algn="l"/>
-            <a:endParaRPr/>
+            <a:endParaRPr dirty="0"/>
           </a:p>
           <a:p>
             <a:pPr>
-              <a:defRPr sz="6000" b="1">
+              <a:defRPr sz="3200" b="1">
                 <a:solidFill>
                   <a:srgbClr val="003366"/>
                 </a:solidFill>
@@ -4377,8 +5618,97 @@
               </a:defRPr>
             </a:pPr>
             <a:r>
-              <a:t>RESOLUTION</a:t>
-            </a:r>
+              <a:rPr dirty="0"/>
+              <a:t>Financial penalties are triggered but frustration remains</a:t>
+            </a:r>
+          </a:p>
+        </p:txBody>
+      </p:sp>
+      <p:sp>
+        <p:nvSpPr>
+          <p:cNvPr id="3" name="TextBox 2"/>
+          <p:cNvSpPr txBox="1"/>
+          <p:nvPr/>
+        </p:nvSpPr>
+        <p:spPr>
+          <a:xfrm>
+            <a:off x="457136" y="914400"/>
+            <a:ext cx="11274552" cy="2739211"/>
+          </a:xfrm>
+          <a:prstGeom prst="rect">
+            <a:avLst/>
+          </a:prstGeom>
+          <a:noFill/>
+        </p:spPr>
+        <p:txBody>
+          <a:bodyPr wrap="square">
+            <a:spAutoFit/>
+          </a:bodyPr>
+          <a:lstStyle/>
+          <a:p>
+            <a:endParaRPr dirty="0"/>
+          </a:p>
+          <a:p>
+            <a:pPr>
+              <a:defRPr sz="2200">
+                <a:solidFill>
+                  <a:srgbClr val="282828"/>
+                </a:solidFill>
+                <a:latin typeface="Segoe UI"/>
+              </a:defRPr>
+            </a:pPr>
+            <a:r>
+              <a:rPr dirty="0"/>
+              <a:t>Current system fines $200 for each repeat missed pickup, but penalties don’t address root causes.</a:t>
+            </a:r>
+            <a:br>
+              <a:rPr dirty="0"/>
+            </a:br>
+            <a:br>
+              <a:rPr dirty="0"/>
+            </a:br>
+            <a:r>
+              <a:rPr dirty="0"/>
+              <a:t>[</a:t>
+            </a:r>
+            <a:r>
+              <a:rPr lang="en-US" dirty="0"/>
+              <a:t>Chris to </a:t>
+            </a:r>
+            <a:r>
+              <a:rPr dirty="0"/>
+              <a:t>Insert:</a:t>
+            </a:r>
+            <a:r>
+              <a:rPr lang="en-US" dirty="0"/>
+              <a:t> </a:t>
+            </a:r>
+            <a:r>
+              <a:rPr lang="en-US" sz="2200" dirty="0"/>
+              <a:t>Heat map that shows the total fines, each by zip code.  Maybe just use matplotlib since all the data we need is in the CSV?]</a:t>
+            </a:r>
+          </a:p>
+          <a:p>
+            <a:pPr>
+              <a:defRPr sz="2200">
+                <a:solidFill>
+                  <a:srgbClr val="282828"/>
+                </a:solidFill>
+                <a:latin typeface="Segoe UI"/>
+              </a:defRPr>
+            </a:pPr>
+            <a:endParaRPr lang="en-US" sz="2200" dirty="0"/>
+          </a:p>
+          <a:p>
+            <a:pPr>
+              <a:defRPr sz="2200">
+                <a:solidFill>
+                  <a:srgbClr val="282828"/>
+                </a:solidFill>
+                <a:latin typeface="Segoe UI"/>
+              </a:defRPr>
+            </a:pPr>
+            <a:endParaRPr dirty="0"/>
           </a:p>
         </p:txBody>
       </p:sp>

</xml_diff>